<commit_message>
slides, and new hw2
</commit_message>
<xml_diff>
--- a/slides/dailyannouncements.pptx
+++ b/slides/dailyannouncements.pptx
@@ -5,10 +5,10 @@
     <p:sldMasterId id="2147483728" r:id="rId1"/>
   </p:sldMasterIdLst>
   <p:notesMasterIdLst>
-    <p:notesMasterId r:id="rId7"/>
+    <p:notesMasterId r:id="rId9"/>
   </p:notesMasterIdLst>
   <p:handoutMasterIdLst>
-    <p:handoutMasterId r:id="rId8"/>
+    <p:handoutMasterId r:id="rId10"/>
   </p:handoutMasterIdLst>
   <p:sldIdLst>
     <p:sldId id="447" r:id="rId2"/>
@@ -16,11 +16,13 @@
     <p:sldId id="402" r:id="rId4"/>
     <p:sldId id="485" r:id="rId5"/>
     <p:sldId id="486" r:id="rId6"/>
+    <p:sldId id="487" r:id="rId7"/>
+    <p:sldId id="488" r:id="rId8"/>
   </p:sldIdLst>
   <p:sldSz cx="9144000" cy="6858000" type="screen4x3"/>
   <p:notesSz cx="7315200" cy="9601200"/>
   <p:custDataLst>
-    <p:tags r:id="rId9"/>
+    <p:tags r:id="rId11"/>
   </p:custDataLst>
   <p:defaultTextStyle>
     <a:defPPr>
@@ -1020,7 +1022,7 @@
             <a:fld id="{E4886CB5-510A-4EF6-9466-BC7A8F0DDE87}" type="datetime1">
               <a:rPr lang="en-US" smtClean="0"/>
               <a:pPr/>
-              <a:t>2/16/21</a:t>
+              <a:t>2/25/21</a:t>
             </a:fld>
             <a:endParaRPr lang="en-US"/>
           </a:p>
@@ -1380,7 +1382,7 @@
             <a:fld id="{9B297853-24B4-4D05-83E4-0AD2E86C55E5}" type="datetime1">
               <a:rPr lang="en-US" smtClean="0"/>
               <a:pPr/>
-              <a:t>2/16/21</a:t>
+              <a:t>2/25/21</a:t>
             </a:fld>
             <a:endParaRPr lang="en-US"/>
           </a:p>
@@ -1556,7 +1558,7 @@
             <a:fld id="{01FCDD9E-5768-4705-9537-0C020B1BB310}" type="datetime1">
               <a:rPr lang="en-US" smtClean="0"/>
               <a:pPr/>
-              <a:t>2/16/21</a:t>
+              <a:t>2/25/21</a:t>
             </a:fld>
             <a:endParaRPr lang="en-US"/>
           </a:p>
@@ -1792,7 +1794,7 @@
             <a:fld id="{4257C27E-59C2-41CA-9776-94955CBEE440}" type="datetime1">
               <a:rPr lang="en-US" smtClean="0"/>
               <a:pPr/>
-              <a:t>2/16/21</a:t>
+              <a:t>2/25/21</a:t>
             </a:fld>
             <a:endParaRPr lang="en-US"/>
           </a:p>
@@ -2078,7 +2080,7 @@
             <a:fld id="{03180747-A137-49C6-9C74-AB7EE86F4904}" type="datetime1">
               <a:rPr lang="en-US" smtClean="0"/>
               <a:pPr/>
-              <a:t>2/16/21</a:t>
+              <a:t>2/25/21</a:t>
             </a:fld>
             <a:endParaRPr lang="en-US"/>
           </a:p>
@@ -2299,7 +2301,7 @@
             <a:fld id="{EBBA31D9-ADC1-480D-86A8-1EAFB6A86A35}" type="datetime1">
               <a:rPr lang="en-US" smtClean="0"/>
               <a:pPr/>
-              <a:t>2/16/21</a:t>
+              <a:t>2/25/21</a:t>
             </a:fld>
             <a:endParaRPr lang="en-US"/>
           </a:p>
@@ -2652,7 +2654,7 @@
             <a:fld id="{80AAE9AE-3B2F-4DEA-8C41-BDDF4CDF6F40}" type="datetime1">
               <a:rPr lang="en-US" smtClean="0"/>
               <a:pPr/>
-              <a:t>2/16/21</a:t>
+              <a:t>2/25/21</a:t>
             </a:fld>
             <a:endParaRPr lang="en-US"/>
           </a:p>
@@ -2885,7 +2887,7 @@
             <a:fld id="{48252F7F-E8FE-413B-8521-D4ED924C6DE5}" type="datetime1">
               <a:rPr lang="en-US" smtClean="0"/>
               <a:pPr/>
-              <a:t>2/16/21</a:t>
+              <a:t>2/25/21</a:t>
             </a:fld>
             <a:endParaRPr lang="en-US"/>
           </a:p>
@@ -3027,7 +3029,7 @@
             <a:fld id="{2FF1B124-70E3-4E4A-90E2-6B55DB7659B3}" type="datetime1">
               <a:rPr lang="en-US" smtClean="0"/>
               <a:pPr/>
-              <a:t>2/16/21</a:t>
+              <a:t>2/25/21</a:t>
             </a:fld>
             <a:endParaRPr lang="en-US"/>
           </a:p>
@@ -3305,7 +3307,7 @@
             <a:fld id="{4EBF4C98-3CD6-4C87-BD40-5718C2628835}" type="datetime1">
               <a:rPr lang="en-US" smtClean="0"/>
               <a:pPr/>
-              <a:t>2/16/21</a:t>
+              <a:t>2/25/21</a:t>
             </a:fld>
             <a:endParaRPr lang="en-US"/>
           </a:p>
@@ -3713,7 +3715,7 @@
             <a:fld id="{6D6408A8-6B1B-4CDA-875E-7BEECDBA31DF}" type="datetime1">
               <a:rPr lang="en-US" smtClean="0"/>
               <a:pPr/>
-              <a:t>2/16/21</a:t>
+              <a:t>2/25/21</a:t>
             </a:fld>
             <a:endParaRPr lang="en-US"/>
           </a:p>
@@ -4051,7 +4053,7 @@
             <a:fld id="{C55AAF07-D2F5-4B3C-B443-40DE8C337A77}" type="datetime1">
               <a:rPr lang="en-US" smtClean="0"/>
               <a:pPr/>
-              <a:t>2/16/21</a:t>
+              <a:t>2/25/21</a:t>
             </a:fld>
             <a:endParaRPr lang="en-US"/>
           </a:p>
@@ -5342,7 +5344,448 @@
 </p:sld>
 </file>
 
+<file path=ppt/slides/slide6.xml><?xml version="1.0" encoding="utf-8"?>
+<p:sld xmlns:a="http://schemas.openxmlformats.org/drawingml/2006/main" xmlns:r="http://schemas.openxmlformats.org/officeDocument/2006/relationships" xmlns:p="http://schemas.openxmlformats.org/presentationml/2006/main">
+  <p:cSld>
+    <p:spTree>
+      <p:nvGrpSpPr>
+        <p:cNvPr id="1" name=""/>
+        <p:cNvGrpSpPr/>
+        <p:nvPr/>
+      </p:nvGrpSpPr>
+      <p:grpSpPr>
+        <a:xfrm>
+          <a:off x="0" y="0"/>
+          <a:ext cx="0" cy="0"/>
+          <a:chOff x="0" y="0"/>
+          <a:chExt cx="0" cy="0"/>
+        </a:xfrm>
+      </p:grpSpPr>
+      <p:sp>
+        <p:nvSpPr>
+          <p:cNvPr id="6146" name="Rectangle 2"/>
+          <p:cNvSpPr>
+            <a:spLocks noGrp="1" noChangeArrowheads="1"/>
+          </p:cNvSpPr>
+          <p:nvPr>
+            <p:ph type="title"/>
+            <p:custDataLst>
+              <p:tags r:id="rId1"/>
+            </p:custDataLst>
+          </p:nvPr>
+        </p:nvSpPr>
+        <p:spPr/>
+        <p:txBody>
+          <a:bodyPr/>
+          <a:lstStyle/>
+          <a:p>
+            <a:r>
+              <a:rPr lang="en-US" dirty="0"/>
+              <a:t>Tuesday, Feb. 23</a:t>
+            </a:r>
+          </a:p>
+        </p:txBody>
+      </p:sp>
+      <p:sp>
+        <p:nvSpPr>
+          <p:cNvPr id="6147" name="Rectangle 3"/>
+          <p:cNvSpPr>
+            <a:spLocks noGrp="1" noChangeArrowheads="1"/>
+          </p:cNvSpPr>
+          <p:nvPr>
+            <p:ph sz="quarter" idx="1"/>
+            <p:custDataLst>
+              <p:tags r:id="rId2"/>
+            </p:custDataLst>
+          </p:nvPr>
+        </p:nvSpPr>
+        <p:spPr>
+          <a:xfrm>
+            <a:off x="381000" y="1371600"/>
+            <a:ext cx="8255000" cy="5105400"/>
+          </a:xfrm>
+        </p:spPr>
+        <p:txBody>
+          <a:bodyPr>
+            <a:normAutofit fontScale="92500" lnSpcReduction="10000"/>
+          </a:bodyPr>
+          <a:lstStyle/>
+          <a:p>
+            <a:r>
+              <a:rPr lang="en-US" dirty="0" err="1"/>
+              <a:t>Gradescope</a:t>
+            </a:r>
+            <a:r>
+              <a:rPr lang="en-US" dirty="0"/>
+              <a:t> is live (link via Collab to sign up)</a:t>
+            </a:r>
+          </a:p>
+          <a:p>
+            <a:pPr lvl="1"/>
+            <a:r>
+              <a:rPr lang="en-US" dirty="0" err="1"/>
+              <a:t>hw</a:t>
+            </a:r>
+            <a:r>
+              <a:rPr lang="en-US" dirty="0"/>
+              <a:t> 1 </a:t>
+            </a:r>
+            <a:r>
+              <a:rPr lang="en-US" dirty="0" err="1"/>
+              <a:t>autograder</a:t>
+            </a:r>
+            <a:r>
+              <a:rPr lang="en-US" dirty="0"/>
+              <a:t> was messed up, should be fixed now</a:t>
+            </a:r>
+          </a:p>
+          <a:p>
+            <a:pPr lvl="1"/>
+            <a:r>
+              <a:rPr lang="en-US" dirty="0"/>
+              <a:t>Grading is a little more generous now.</a:t>
+            </a:r>
+          </a:p>
+          <a:p>
+            <a:pPr lvl="1"/>
+            <a:r>
+              <a:rPr lang="en-US" dirty="0" err="1"/>
+              <a:t>Tas</a:t>
+            </a:r>
+            <a:r>
+              <a:rPr lang="en-US" dirty="0"/>
+              <a:t> are grading non-</a:t>
+            </a:r>
+            <a:r>
+              <a:rPr lang="en-US" dirty="0" err="1"/>
+              <a:t>autograded</a:t>
+            </a:r>
+            <a:r>
+              <a:rPr lang="en-US" dirty="0"/>
+              <a:t> submissions on rolling basis</a:t>
+            </a:r>
+          </a:p>
+          <a:p>
+            <a:r>
+              <a:rPr lang="en-US" dirty="0"/>
+              <a:t>Will be sending a poll on guest lecture feedback</a:t>
+            </a:r>
+          </a:p>
+          <a:p>
+            <a:pPr lvl="1"/>
+            <a:r>
+              <a:rPr lang="en-US" dirty="0"/>
+              <a:t>Please don’t leave these mid talk. Not a good look.</a:t>
+            </a:r>
+          </a:p>
+          <a:p>
+            <a:r>
+              <a:rPr lang="en-US" dirty="0"/>
+              <a:t>OH are up and have started</a:t>
+            </a:r>
+          </a:p>
+          <a:p>
+            <a:pPr lvl="1"/>
+            <a:r>
+              <a:rPr lang="en-US" dirty="0"/>
+              <a:t>Grading office hours are for grading (wait, </a:t>
+            </a:r>
+            <a:r>
+              <a:rPr lang="en-US" dirty="0" err="1"/>
+              <a:t>whaaaat</a:t>
+            </a:r>
+            <a:r>
+              <a:rPr lang="en-US" dirty="0"/>
+              <a:t>?)</a:t>
+            </a:r>
+          </a:p>
+          <a:p>
+            <a:r>
+              <a:rPr lang="en-US" dirty="0"/>
+              <a:t>Recommended schedule is up on course website now!</a:t>
+            </a:r>
+          </a:p>
+          <a:p>
+            <a:pPr lvl="1"/>
+            <a:r>
+              <a:rPr lang="en-US" dirty="0"/>
+              <a:t>You should be working on hw1 now and finish by end of next week</a:t>
+            </a:r>
+          </a:p>
+          <a:p>
+            <a:r>
+              <a:rPr lang="en-US" dirty="0"/>
+              <a:t>My office hours are Wed. 9:15-10:45am…woo!</a:t>
+            </a:r>
+          </a:p>
+          <a:p>
+            <a:r>
+              <a:rPr lang="en-US" dirty="0"/>
+              <a:t>Today we will continue w/ graphs and also chat about hw1 hints</a:t>
+            </a:r>
+          </a:p>
+        </p:txBody>
+      </p:sp>
+      <p:sp>
+        <p:nvSpPr>
+          <p:cNvPr id="4" name="Slide Number Placeholder 3"/>
+          <p:cNvSpPr>
+            <a:spLocks noGrp="1"/>
+          </p:cNvSpPr>
+          <p:nvPr>
+            <p:ph type="sldNum" sz="quarter" idx="12"/>
+          </p:nvPr>
+        </p:nvSpPr>
+        <p:spPr/>
+        <p:txBody>
+          <a:bodyPr/>
+          <a:lstStyle/>
+          <a:p>
+            <a:fld id="{F26D9103-0C5C-48AC-B68E-3ED2C1647047}" type="slidenum">
+              <a:rPr lang="en-US" smtClean="0"/>
+              <a:pPr/>
+              <a:t>6</a:t>
+            </a:fld>
+            <a:endParaRPr lang="en-US" dirty="0"/>
+          </a:p>
+        </p:txBody>
+      </p:sp>
+    </p:spTree>
+    <p:extLst>
+      <p:ext uri="{BB962C8B-B14F-4D97-AF65-F5344CB8AC3E}">
+        <p14:creationId xmlns:p14="http://schemas.microsoft.com/office/powerpoint/2010/main" val="3168984361"/>
+      </p:ext>
+    </p:extLst>
+  </p:cSld>
+  <p:clrMapOvr>
+    <a:masterClrMapping/>
+  </p:clrMapOvr>
+</p:sld>
+</file>
+
+<file path=ppt/slides/slide7.xml><?xml version="1.0" encoding="utf-8"?>
+<p:sld xmlns:a="http://schemas.openxmlformats.org/drawingml/2006/main" xmlns:r="http://schemas.openxmlformats.org/officeDocument/2006/relationships" xmlns:p="http://schemas.openxmlformats.org/presentationml/2006/main">
+  <p:cSld>
+    <p:spTree>
+      <p:nvGrpSpPr>
+        <p:cNvPr id="1" name=""/>
+        <p:cNvGrpSpPr/>
+        <p:nvPr/>
+      </p:nvGrpSpPr>
+      <p:grpSpPr>
+        <a:xfrm>
+          <a:off x="0" y="0"/>
+          <a:ext cx="0" cy="0"/>
+          <a:chOff x="0" y="0"/>
+          <a:chExt cx="0" cy="0"/>
+        </a:xfrm>
+      </p:grpSpPr>
+      <p:sp>
+        <p:nvSpPr>
+          <p:cNvPr id="6146" name="Rectangle 2"/>
+          <p:cNvSpPr>
+            <a:spLocks noGrp="1" noChangeArrowheads="1"/>
+          </p:cNvSpPr>
+          <p:nvPr>
+            <p:ph type="title"/>
+            <p:custDataLst>
+              <p:tags r:id="rId1"/>
+            </p:custDataLst>
+          </p:nvPr>
+        </p:nvSpPr>
+        <p:spPr/>
+        <p:txBody>
+          <a:bodyPr/>
+          <a:lstStyle/>
+          <a:p>
+            <a:r>
+              <a:rPr lang="en-US" dirty="0"/>
+              <a:t>Thursday, Feb. 25</a:t>
+            </a:r>
+          </a:p>
+        </p:txBody>
+      </p:sp>
+      <p:sp>
+        <p:nvSpPr>
+          <p:cNvPr id="6147" name="Rectangle 3"/>
+          <p:cNvSpPr>
+            <a:spLocks noGrp="1" noChangeArrowheads="1"/>
+          </p:cNvSpPr>
+          <p:nvPr>
+            <p:ph sz="quarter" idx="1"/>
+            <p:custDataLst>
+              <p:tags r:id="rId2"/>
+            </p:custDataLst>
+          </p:nvPr>
+        </p:nvSpPr>
+        <p:spPr>
+          <a:xfrm>
+            <a:off x="381000" y="1371600"/>
+            <a:ext cx="8255000" cy="5105400"/>
+          </a:xfrm>
+        </p:spPr>
+        <p:txBody>
+          <a:bodyPr>
+            <a:normAutofit lnSpcReduction="10000"/>
+          </a:bodyPr>
+          <a:lstStyle/>
+          <a:p>
+            <a:r>
+              <a:rPr lang="en-US" dirty="0" err="1"/>
+              <a:t>Gradescope</a:t>
+            </a:r>
+            <a:r>
+              <a:rPr lang="en-US" dirty="0"/>
+              <a:t> is live (link via Collab to sign up)</a:t>
+            </a:r>
+          </a:p>
+          <a:p>
+            <a:pPr lvl="1"/>
+            <a:r>
+              <a:rPr lang="en-US" dirty="0"/>
+              <a:t>All caught up with grading as of today.</a:t>
+            </a:r>
+          </a:p>
+          <a:p>
+            <a:r>
+              <a:rPr lang="en-US" dirty="0"/>
+              <a:t>Will be sending a poll on guest lecture feedback</a:t>
+            </a:r>
+          </a:p>
+          <a:p>
+            <a:pPr lvl="1"/>
+            <a:r>
+              <a:rPr lang="en-US" dirty="0"/>
+              <a:t>Sorry, I’m behind on things </a:t>
+            </a:r>
+            <a:r>
+              <a:rPr lang="en-US" dirty="0">
+                <a:sym typeface="Wingdings" pitchFamily="2" charset="2"/>
+              </a:rPr>
+              <a:t></a:t>
+            </a:r>
+            <a:endParaRPr lang="en-US" dirty="0"/>
+          </a:p>
+          <a:p>
+            <a:r>
+              <a:rPr lang="en-US" dirty="0"/>
+              <a:t>OH are up and have started</a:t>
+            </a:r>
+          </a:p>
+          <a:p>
+            <a:pPr lvl="1"/>
+            <a:r>
+              <a:rPr lang="en-US" dirty="0"/>
+              <a:t>Grading office hours are for grading (wait, </a:t>
+            </a:r>
+            <a:r>
+              <a:rPr lang="en-US" dirty="0" err="1"/>
+              <a:t>whaaaat</a:t>
+            </a:r>
+            <a:r>
+              <a:rPr lang="en-US" dirty="0"/>
+              <a:t>?)</a:t>
+            </a:r>
+          </a:p>
+          <a:p>
+            <a:r>
+              <a:rPr lang="en-US" dirty="0"/>
+              <a:t>Recommended schedule is up on course website now!</a:t>
+            </a:r>
+          </a:p>
+          <a:p>
+            <a:pPr lvl="1"/>
+            <a:r>
+              <a:rPr lang="en-US" dirty="0"/>
+              <a:t>You should be working on hw1 now and finish by end of week</a:t>
+            </a:r>
+          </a:p>
+          <a:p>
+            <a:r>
+              <a:rPr lang="en-US" dirty="0"/>
+              <a:t>My office hours are Wed. 9:15-10:45am…woo!</a:t>
+            </a:r>
+          </a:p>
+          <a:p>
+            <a:pPr lvl="1"/>
+            <a:r>
+              <a:rPr lang="en-US" dirty="0"/>
+              <a:t>But I totally forgot about them…ugh</a:t>
+            </a:r>
+          </a:p>
+          <a:p>
+            <a:r>
+              <a:rPr lang="en-US" dirty="0"/>
+              <a:t>Today we will finish “classical search” and discuss A*</a:t>
+            </a:r>
+          </a:p>
+          <a:p>
+            <a:pPr lvl="1"/>
+            <a:r>
+              <a:rPr lang="en-US" dirty="0"/>
+              <a:t>You’ll be prepared to start </a:t>
+            </a:r>
+            <a:r>
+              <a:rPr lang="en-US" dirty="0" err="1"/>
+              <a:t>hw</a:t>
+            </a:r>
+            <a:r>
+              <a:rPr lang="en-US" dirty="0"/>
+              <a:t> 2 after today!!</a:t>
+            </a:r>
+          </a:p>
+        </p:txBody>
+      </p:sp>
+      <p:sp>
+        <p:nvSpPr>
+          <p:cNvPr id="4" name="Slide Number Placeholder 3"/>
+          <p:cNvSpPr>
+            <a:spLocks noGrp="1"/>
+          </p:cNvSpPr>
+          <p:nvPr>
+            <p:ph type="sldNum" sz="quarter" idx="12"/>
+          </p:nvPr>
+        </p:nvSpPr>
+        <p:spPr/>
+        <p:txBody>
+          <a:bodyPr/>
+          <a:lstStyle/>
+          <a:p>
+            <a:fld id="{F26D9103-0C5C-48AC-B68E-3ED2C1647047}" type="slidenum">
+              <a:rPr lang="en-US" smtClean="0"/>
+              <a:pPr/>
+              <a:t>7</a:t>
+            </a:fld>
+            <a:endParaRPr lang="en-US" dirty="0"/>
+          </a:p>
+        </p:txBody>
+      </p:sp>
+    </p:spTree>
+    <p:extLst>
+      <p:ext uri="{BB962C8B-B14F-4D97-AF65-F5344CB8AC3E}">
+        <p14:creationId xmlns:p14="http://schemas.microsoft.com/office/powerpoint/2010/main" val="2377766741"/>
+      </p:ext>
+    </p:extLst>
+  </p:cSld>
+  <p:clrMapOvr>
+    <a:masterClrMapping/>
+  </p:clrMapOvr>
+</p:sld>
+</file>
+
 <file path=ppt/tags/tag1.xml><?xml version="1.0" encoding="utf-8"?>
+<p:tagLst xmlns:a="http://schemas.openxmlformats.org/drawingml/2006/main" xmlns:r="http://schemas.openxmlformats.org/officeDocument/2006/relationships" xmlns:p="http://schemas.openxmlformats.org/presentationml/2006/main">
+  <p:tag name="_INSTRUCTOR VIEW19C14C36-AC8E-43BC-9DB6-C2AAF774C7DC|PANE__TAG" val="_"/>
+</p:tagLst>
+</file>
+
+<file path=ppt/tags/tag10.xml><?xml version="1.0" encoding="utf-8"?>
+<p:tagLst xmlns:a="http://schemas.openxmlformats.org/drawingml/2006/main" xmlns:r="http://schemas.openxmlformats.org/officeDocument/2006/relationships" xmlns:p="http://schemas.openxmlformats.org/presentationml/2006/main">
+  <p:tag name="_INSTRUCTOR VIEW19C14C36-AC8E-43BC-9DB6-C2AAF774C7DC|PANE__TAG" val="_"/>
+</p:tagLst>
+</file>
+
+<file path=ppt/tags/tag11.xml><?xml version="1.0" encoding="utf-8"?>
 <p:tagLst xmlns:a="http://schemas.openxmlformats.org/drawingml/2006/main" xmlns:r="http://schemas.openxmlformats.org/officeDocument/2006/relationships" xmlns:p="http://schemas.openxmlformats.org/presentationml/2006/main">
   <p:tag name="_INSTRUCTOR VIEW19C14C36-AC8E-43BC-9DB6-C2AAF774C7DC|PANE__TAG" val="_"/>
 </p:tagLst>
@@ -5379,6 +5822,18 @@
 </file>
 
 <file path=ppt/tags/tag7.xml><?xml version="1.0" encoding="utf-8"?>
+<p:tagLst xmlns:a="http://schemas.openxmlformats.org/drawingml/2006/main" xmlns:r="http://schemas.openxmlformats.org/officeDocument/2006/relationships" xmlns:p="http://schemas.openxmlformats.org/presentationml/2006/main">
+  <p:tag name="_INSTRUCTOR VIEW19C14C36-AC8E-43BC-9DB6-C2AAF774C7DC|PANE__TAG" val="_"/>
+</p:tagLst>
+</file>
+
+<file path=ppt/tags/tag8.xml><?xml version="1.0" encoding="utf-8"?>
+<p:tagLst xmlns:a="http://schemas.openxmlformats.org/drawingml/2006/main" xmlns:r="http://schemas.openxmlformats.org/officeDocument/2006/relationships" xmlns:p="http://schemas.openxmlformats.org/presentationml/2006/main">
+  <p:tag name="_INSTRUCTOR VIEW19C14C36-AC8E-43BC-9DB6-C2AAF774C7DC|PANE__TAG" val="_"/>
+</p:tagLst>
+</file>
+
+<file path=ppt/tags/tag9.xml><?xml version="1.0" encoding="utf-8"?>
 <p:tagLst xmlns:a="http://schemas.openxmlformats.org/drawingml/2006/main" xmlns:r="http://schemas.openxmlformats.org/officeDocument/2006/relationships" xmlns:p="http://schemas.openxmlformats.org/presentationml/2006/main">
   <p:tag name="_INSTRUCTOR VIEW19C14C36-AC8E-43BC-9DB6-C2AAF774C7DC|PANE__TAG" val="_"/>
 </p:tagLst>

</xml_diff>